<commit_message>
Update Python requirements with spaCy model
</commit_message>
<xml_diff>
--- a/python_course/5_nlp/python_cursus_5.pptx
+++ b/python_course/5_nlp/python_cursus_5.pptx
@@ -319,7 +319,7 @@
           <a:p>
             <a:fld id="{5E9D55AD-DA6B-4A9D-BFE6-D0A1673E6EA9}" type="datetimeFigureOut">
               <a:rPr lang="en-NL" smtClean="0"/>
-              <a:t>23/10/2024</a:t>
+              <a:t>24/10/2024</a:t>
             </a:fld>
             <a:endParaRPr lang="en-NL"/>
           </a:p>
@@ -519,7 +519,7 @@
           <a:p>
             <a:fld id="{5E9D55AD-DA6B-4A9D-BFE6-D0A1673E6EA9}" type="datetimeFigureOut">
               <a:rPr lang="en-NL" smtClean="0"/>
-              <a:t>23/10/2024</a:t>
+              <a:t>24/10/2024</a:t>
             </a:fld>
             <a:endParaRPr lang="en-NL"/>
           </a:p>
@@ -729,7 +729,7 @@
           <a:p>
             <a:fld id="{5E9D55AD-DA6B-4A9D-BFE6-D0A1673E6EA9}" type="datetimeFigureOut">
               <a:rPr lang="en-NL" smtClean="0"/>
-              <a:t>23/10/2024</a:t>
+              <a:t>24/10/2024</a:t>
             </a:fld>
             <a:endParaRPr lang="en-NL"/>
           </a:p>
@@ -929,7 +929,7 @@
           <a:p>
             <a:fld id="{5E9D55AD-DA6B-4A9D-BFE6-D0A1673E6EA9}" type="datetimeFigureOut">
               <a:rPr lang="en-NL" smtClean="0"/>
-              <a:t>23/10/2024</a:t>
+              <a:t>24/10/2024</a:t>
             </a:fld>
             <a:endParaRPr lang="en-NL"/>
           </a:p>
@@ -1205,7 +1205,7 @@
           <a:p>
             <a:fld id="{5E9D55AD-DA6B-4A9D-BFE6-D0A1673E6EA9}" type="datetimeFigureOut">
               <a:rPr lang="en-NL" smtClean="0"/>
-              <a:t>23/10/2024</a:t>
+              <a:t>24/10/2024</a:t>
             </a:fld>
             <a:endParaRPr lang="en-NL"/>
           </a:p>
@@ -1473,7 +1473,7 @@
           <a:p>
             <a:fld id="{5E9D55AD-DA6B-4A9D-BFE6-D0A1673E6EA9}" type="datetimeFigureOut">
               <a:rPr lang="en-NL" smtClean="0"/>
-              <a:t>23/10/2024</a:t>
+              <a:t>24/10/2024</a:t>
             </a:fld>
             <a:endParaRPr lang="en-NL"/>
           </a:p>
@@ -1888,7 +1888,7 @@
           <a:p>
             <a:fld id="{5E9D55AD-DA6B-4A9D-BFE6-D0A1673E6EA9}" type="datetimeFigureOut">
               <a:rPr lang="en-NL" smtClean="0"/>
-              <a:t>23/10/2024</a:t>
+              <a:t>24/10/2024</a:t>
             </a:fld>
             <a:endParaRPr lang="en-NL"/>
           </a:p>
@@ -2030,7 +2030,7 @@
           <a:p>
             <a:fld id="{5E9D55AD-DA6B-4A9D-BFE6-D0A1673E6EA9}" type="datetimeFigureOut">
               <a:rPr lang="en-NL" smtClean="0"/>
-              <a:t>23/10/2024</a:t>
+              <a:t>24/10/2024</a:t>
             </a:fld>
             <a:endParaRPr lang="en-NL"/>
           </a:p>
@@ -2143,7 +2143,7 @@
           <a:p>
             <a:fld id="{5E9D55AD-DA6B-4A9D-BFE6-D0A1673E6EA9}" type="datetimeFigureOut">
               <a:rPr lang="en-NL" smtClean="0"/>
-              <a:t>23/10/2024</a:t>
+              <a:t>24/10/2024</a:t>
             </a:fld>
             <a:endParaRPr lang="en-NL"/>
           </a:p>
@@ -2456,7 +2456,7 @@
           <a:p>
             <a:fld id="{5E9D55AD-DA6B-4A9D-BFE6-D0A1673E6EA9}" type="datetimeFigureOut">
               <a:rPr lang="en-NL" smtClean="0"/>
-              <a:t>23/10/2024</a:t>
+              <a:t>24/10/2024</a:t>
             </a:fld>
             <a:endParaRPr lang="en-NL"/>
           </a:p>
@@ -2745,7 +2745,7 @@
           <a:p>
             <a:fld id="{5E9D55AD-DA6B-4A9D-BFE6-D0A1673E6EA9}" type="datetimeFigureOut">
               <a:rPr lang="en-NL" smtClean="0"/>
-              <a:t>23/10/2024</a:t>
+              <a:t>24/10/2024</a:t>
             </a:fld>
             <a:endParaRPr lang="en-NL"/>
           </a:p>
@@ -2988,7 +2988,7 @@
           <a:p>
             <a:fld id="{5E9D55AD-DA6B-4A9D-BFE6-D0A1673E6EA9}" type="datetimeFigureOut">
               <a:rPr lang="en-NL" smtClean="0"/>
-              <a:t>23/10/2024</a:t>
+              <a:t>24/10/2024</a:t>
             </a:fld>
             <a:endParaRPr lang="en-NL"/>
           </a:p>
@@ -3456,7 +3456,7 @@
           <a:p>
             <a:r>
               <a:rPr lang="nl-NL" noProof="0"/>
-              <a:t>2023</a:t>
+              <a:t>2024</a:t>
             </a:r>
             <a:endParaRPr lang="nl-NL" noProof="0" dirty="0"/>
           </a:p>

</xml_diff>